<commit_message>
Chapter 5 done till Page 30. (Completed Example 5.1)
</commit_message>
<xml_diff>
--- a/Word/Diagrams/chapter5/chap 5 extra.figures.pptx
+++ b/Word/Diagrams/chapter5/chap 5 extra.figures.pptx
@@ -211,7 +211,7 @@
             <a:fld id="{9CCF083D-F2BC-4786-8C77-844DFCD3515B}" type="datetimeFigureOut">
               <a:rPr lang="zh-TW" altLang="en-US" smtClean="0"/>
               <a:pPr/>
-              <a:t>2015/7/13</a:t>
+              <a:t>2021/4/21</a:t>
             </a:fld>
             <a:endParaRPr lang="zh-TW" altLang="en-US"/>
           </a:p>
@@ -275,35 +275,35 @@
           <a:p>
             <a:pPr lvl="0"/>
             <a:r>
-              <a:rPr lang="en-US" altLang="zh-TW" smtClean="0"/>
+              <a:rPr lang="en-US" altLang="zh-TW"/>
               <a:t>Click to edit Master text styles</a:t>
             </a:r>
           </a:p>
           <a:p>
             <a:pPr lvl="1"/>
             <a:r>
-              <a:rPr lang="en-US" altLang="zh-TW" smtClean="0"/>
+              <a:rPr lang="en-US" altLang="zh-TW"/>
               <a:t>Second level</a:t>
             </a:r>
           </a:p>
           <a:p>
             <a:pPr lvl="2"/>
             <a:r>
-              <a:rPr lang="en-US" altLang="zh-TW" smtClean="0"/>
+              <a:rPr lang="en-US" altLang="zh-TW"/>
               <a:t>Third level</a:t>
             </a:r>
           </a:p>
           <a:p>
             <a:pPr lvl="3"/>
             <a:r>
-              <a:rPr lang="en-US" altLang="zh-TW" smtClean="0"/>
+              <a:rPr lang="en-US" altLang="zh-TW"/>
               <a:t>Fourth level</a:t>
             </a:r>
           </a:p>
           <a:p>
             <a:pPr lvl="4"/>
             <a:r>
-              <a:rPr lang="en-US" altLang="zh-TW" smtClean="0"/>
+              <a:rPr lang="en-US" altLang="zh-TW"/>
               <a:t>Fifth level</a:t>
             </a:r>
             <a:endParaRPr lang="zh-TW" altLang="en-US"/>
@@ -529,7 +529,7 @@
           </a:lstStyle>
           <a:p>
             <a:r>
-              <a:rPr lang="en-US" smtClean="0"/>
+              <a:rPr lang="en-US"/>
               <a:t>Click to edit Master title style</a:t>
             </a:r>
             <a:endParaRPr lang="en-US" dirty="0"/>
@@ -650,7 +650,7 @@
           </a:lstStyle>
           <a:p>
             <a:r>
-              <a:rPr lang="en-US" smtClean="0"/>
+              <a:rPr lang="en-US"/>
               <a:t>Click to edit Master subtitle style</a:t>
             </a:r>
             <a:endParaRPr lang="en-US" dirty="0"/>
@@ -675,7 +675,7 @@
             <a:fld id="{E3D07B0C-BD95-41BE-BB3E-AC75822DF381}" type="datetimeFigureOut">
               <a:rPr lang="en-US" smtClean="0"/>
               <a:pPr/>
-              <a:t>7/13/2015</a:t>
+              <a:t>4/21/2021</a:t>
             </a:fld>
             <a:endParaRPr lang="en-US"/>
           </a:p>
@@ -765,10 +765,9 @@
           <a:lstStyle/>
           <a:p>
             <a:r>
-              <a:rPr lang="en-US" smtClean="0"/>
+              <a:rPr lang="en-US"/>
               <a:t>Click to edit Master title style</a:t>
             </a:r>
-            <a:endParaRPr lang="en-US"/>
           </a:p>
         </p:txBody>
       </p:sp>
@@ -789,38 +788,37 @@
           <a:p>
             <a:pPr lvl="0"/>
             <a:r>
-              <a:rPr lang="en-US" smtClean="0"/>
+              <a:rPr lang="en-US"/>
               <a:t>Click to edit Master text styles</a:t>
             </a:r>
           </a:p>
           <a:p>
             <a:pPr lvl="1"/>
             <a:r>
-              <a:rPr lang="en-US" smtClean="0"/>
+              <a:rPr lang="en-US"/>
               <a:t>Second level</a:t>
             </a:r>
           </a:p>
           <a:p>
             <a:pPr lvl="2"/>
             <a:r>
-              <a:rPr lang="en-US" smtClean="0"/>
+              <a:rPr lang="en-US"/>
               <a:t>Third level</a:t>
             </a:r>
           </a:p>
           <a:p>
             <a:pPr lvl="3"/>
             <a:r>
-              <a:rPr lang="en-US" smtClean="0"/>
+              <a:rPr lang="en-US"/>
               <a:t>Fourth level</a:t>
             </a:r>
           </a:p>
           <a:p>
             <a:pPr lvl="4"/>
             <a:r>
-              <a:rPr lang="en-US" smtClean="0"/>
+              <a:rPr lang="en-US"/>
               <a:t>Fifth level</a:t>
             </a:r>
-            <a:endParaRPr lang="en-US"/>
           </a:p>
         </p:txBody>
       </p:sp>
@@ -842,7 +840,7 @@
             <a:fld id="{E3D07B0C-BD95-41BE-BB3E-AC75822DF381}" type="datetimeFigureOut">
               <a:rPr lang="en-US" smtClean="0"/>
               <a:pPr/>
-              <a:t>7/13/2015</a:t>
+              <a:t>4/21/2021</a:t>
             </a:fld>
             <a:endParaRPr lang="en-US"/>
           </a:p>
@@ -937,7 +935,7 @@
           <a:lstStyle/>
           <a:p>
             <a:r>
-              <a:rPr lang="en-US" smtClean="0"/>
+              <a:rPr lang="en-US"/>
               <a:t>Click to edit Master title style</a:t>
             </a:r>
             <a:endParaRPr lang="en-US" dirty="0"/>
@@ -966,38 +964,37 @@
           <a:p>
             <a:pPr lvl="0"/>
             <a:r>
-              <a:rPr lang="en-US" smtClean="0"/>
+              <a:rPr lang="en-US"/>
               <a:t>Click to edit Master text styles</a:t>
             </a:r>
           </a:p>
           <a:p>
             <a:pPr lvl="1"/>
             <a:r>
-              <a:rPr lang="en-US" smtClean="0"/>
+              <a:rPr lang="en-US"/>
               <a:t>Second level</a:t>
             </a:r>
           </a:p>
           <a:p>
             <a:pPr lvl="2"/>
             <a:r>
-              <a:rPr lang="en-US" smtClean="0"/>
+              <a:rPr lang="en-US"/>
               <a:t>Third level</a:t>
             </a:r>
           </a:p>
           <a:p>
             <a:pPr lvl="3"/>
             <a:r>
-              <a:rPr lang="en-US" smtClean="0"/>
+              <a:rPr lang="en-US"/>
               <a:t>Fourth level</a:t>
             </a:r>
           </a:p>
           <a:p>
             <a:pPr lvl="4"/>
             <a:r>
-              <a:rPr lang="en-US" smtClean="0"/>
+              <a:rPr lang="en-US"/>
               <a:t>Fifth level</a:t>
             </a:r>
-            <a:endParaRPr lang="en-US"/>
           </a:p>
         </p:txBody>
       </p:sp>
@@ -1019,7 +1016,7 @@
             <a:fld id="{E3D07B0C-BD95-41BE-BB3E-AC75822DF381}" type="datetimeFigureOut">
               <a:rPr lang="en-US" smtClean="0"/>
               <a:pPr/>
-              <a:t>7/13/2015</a:t>
+              <a:t>4/21/2021</a:t>
             </a:fld>
             <a:endParaRPr lang="en-US"/>
           </a:p>
@@ -1109,10 +1106,9 @@
           <a:lstStyle/>
           <a:p>
             <a:r>
-              <a:rPr lang="en-US" smtClean="0"/>
+              <a:rPr lang="en-US"/>
               <a:t>Click to edit Master title style</a:t>
             </a:r>
-            <a:endParaRPr lang="en-US"/>
           </a:p>
         </p:txBody>
       </p:sp>
@@ -1133,38 +1129,37 @@
           <a:p>
             <a:pPr lvl="0"/>
             <a:r>
-              <a:rPr lang="en-US" smtClean="0"/>
+              <a:rPr lang="en-US"/>
               <a:t>Click to edit Master text styles</a:t>
             </a:r>
           </a:p>
           <a:p>
             <a:pPr lvl="1"/>
             <a:r>
-              <a:rPr lang="en-US" smtClean="0"/>
+              <a:rPr lang="en-US"/>
               <a:t>Second level</a:t>
             </a:r>
           </a:p>
           <a:p>
             <a:pPr lvl="2"/>
             <a:r>
-              <a:rPr lang="en-US" smtClean="0"/>
+              <a:rPr lang="en-US"/>
               <a:t>Third level</a:t>
             </a:r>
           </a:p>
           <a:p>
             <a:pPr lvl="3"/>
             <a:r>
-              <a:rPr lang="en-US" smtClean="0"/>
+              <a:rPr lang="en-US"/>
               <a:t>Fourth level</a:t>
             </a:r>
           </a:p>
           <a:p>
             <a:pPr lvl="4"/>
             <a:r>
-              <a:rPr lang="en-US" smtClean="0"/>
+              <a:rPr lang="en-US"/>
               <a:t>Fifth level</a:t>
             </a:r>
-            <a:endParaRPr lang="en-US"/>
           </a:p>
         </p:txBody>
       </p:sp>
@@ -1186,7 +1181,7 @@
             <a:fld id="{E3D07B0C-BD95-41BE-BB3E-AC75822DF381}" type="datetimeFigureOut">
               <a:rPr lang="en-US" smtClean="0"/>
               <a:pPr/>
-              <a:t>7/13/2015</a:t>
+              <a:t>4/21/2021</a:t>
             </a:fld>
             <a:endParaRPr lang="en-US"/>
           </a:p>
@@ -1285,7 +1280,7 @@
           </a:lstStyle>
           <a:p>
             <a:r>
-              <a:rPr lang="en-US" smtClean="0"/>
+              <a:rPr lang="en-US"/>
               <a:t>Click to edit Master title style</a:t>
             </a:r>
             <a:endParaRPr lang="en-US" dirty="0"/>
@@ -1405,7 +1400,7 @@
           <a:p>
             <a:pPr lvl="0"/>
             <a:r>
-              <a:rPr lang="en-US" smtClean="0"/>
+              <a:rPr lang="en-US"/>
               <a:t>Click to edit Master text styles</a:t>
             </a:r>
           </a:p>
@@ -1429,7 +1424,7 @@
             <a:fld id="{E3D07B0C-BD95-41BE-BB3E-AC75822DF381}" type="datetimeFigureOut">
               <a:rPr lang="en-US" smtClean="0"/>
               <a:pPr/>
-              <a:t>7/13/2015</a:t>
+              <a:t>4/21/2021</a:t>
             </a:fld>
             <a:endParaRPr lang="en-US"/>
           </a:p>
@@ -1519,10 +1514,9 @@
           <a:lstStyle/>
           <a:p>
             <a:r>
-              <a:rPr lang="en-US" smtClean="0"/>
+              <a:rPr lang="en-US"/>
               <a:t>Click to edit Master title style</a:t>
             </a:r>
-            <a:endParaRPr lang="en-US"/>
           </a:p>
         </p:txBody>
       </p:sp>
@@ -1576,35 +1570,35 @@
           <a:p>
             <a:pPr lvl="0"/>
             <a:r>
-              <a:rPr lang="en-US" smtClean="0"/>
+              <a:rPr lang="en-US"/>
               <a:t>Click to edit Master text styles</a:t>
             </a:r>
           </a:p>
           <a:p>
             <a:pPr lvl="1"/>
             <a:r>
-              <a:rPr lang="en-US" smtClean="0"/>
+              <a:rPr lang="en-US"/>
               <a:t>Second level</a:t>
             </a:r>
           </a:p>
           <a:p>
             <a:pPr lvl="2"/>
             <a:r>
-              <a:rPr lang="en-US" smtClean="0"/>
+              <a:rPr lang="en-US"/>
               <a:t>Third level</a:t>
             </a:r>
           </a:p>
           <a:p>
             <a:pPr lvl="3"/>
             <a:r>
-              <a:rPr lang="en-US" smtClean="0"/>
+              <a:rPr lang="en-US"/>
               <a:t>Fourth level</a:t>
             </a:r>
           </a:p>
           <a:p>
             <a:pPr lvl="4"/>
             <a:r>
-              <a:rPr lang="en-US" smtClean="0"/>
+              <a:rPr lang="en-US"/>
               <a:t>Fifth level</a:t>
             </a:r>
             <a:endParaRPr lang="en-US" dirty="0"/>
@@ -1661,35 +1655,35 @@
           <a:p>
             <a:pPr lvl="0"/>
             <a:r>
-              <a:rPr lang="en-US" smtClean="0"/>
+              <a:rPr lang="en-US"/>
               <a:t>Click to edit Master text styles</a:t>
             </a:r>
           </a:p>
           <a:p>
             <a:pPr lvl="1"/>
             <a:r>
-              <a:rPr lang="en-US" smtClean="0"/>
+              <a:rPr lang="en-US"/>
               <a:t>Second level</a:t>
             </a:r>
           </a:p>
           <a:p>
             <a:pPr lvl="2"/>
             <a:r>
-              <a:rPr lang="en-US" smtClean="0"/>
+              <a:rPr lang="en-US"/>
               <a:t>Third level</a:t>
             </a:r>
           </a:p>
           <a:p>
             <a:pPr lvl="3"/>
             <a:r>
-              <a:rPr lang="en-US" smtClean="0"/>
+              <a:rPr lang="en-US"/>
               <a:t>Fourth level</a:t>
             </a:r>
           </a:p>
           <a:p>
             <a:pPr lvl="4"/>
             <a:r>
-              <a:rPr lang="en-US" smtClean="0"/>
+              <a:rPr lang="en-US"/>
               <a:t>Fifth level</a:t>
             </a:r>
             <a:endParaRPr lang="en-US" dirty="0"/>
@@ -1714,7 +1708,7 @@
             <a:fld id="{E3D07B0C-BD95-41BE-BB3E-AC75822DF381}" type="datetimeFigureOut">
               <a:rPr lang="en-US" smtClean="0"/>
               <a:pPr/>
-              <a:t>7/13/2015</a:t>
+              <a:t>4/21/2021</a:t>
             </a:fld>
             <a:endParaRPr lang="en-US"/>
           </a:p>
@@ -1808,10 +1802,9 @@
           </a:lstStyle>
           <a:p>
             <a:r>
-              <a:rPr lang="en-US" smtClean="0"/>
+              <a:rPr lang="en-US"/>
               <a:t>Click to edit Master title style</a:t>
             </a:r>
-            <a:endParaRPr lang="en-US"/>
           </a:p>
         </p:txBody>
       </p:sp>
@@ -1880,7 +1873,7 @@
           <a:p>
             <a:pPr lvl="0"/>
             <a:r>
-              <a:rPr lang="en-US" smtClean="0"/>
+              <a:rPr lang="en-US"/>
               <a:t>Click to edit Master text styles</a:t>
             </a:r>
           </a:p>
@@ -1936,35 +1929,35 @@
           <a:p>
             <a:pPr lvl="0"/>
             <a:r>
-              <a:rPr lang="en-US" smtClean="0"/>
+              <a:rPr lang="en-US"/>
               <a:t>Click to edit Master text styles</a:t>
             </a:r>
           </a:p>
           <a:p>
             <a:pPr lvl="1"/>
             <a:r>
-              <a:rPr lang="en-US" smtClean="0"/>
+              <a:rPr lang="en-US"/>
               <a:t>Second level</a:t>
             </a:r>
           </a:p>
           <a:p>
             <a:pPr lvl="2"/>
             <a:r>
-              <a:rPr lang="en-US" smtClean="0"/>
+              <a:rPr lang="en-US"/>
               <a:t>Third level</a:t>
             </a:r>
           </a:p>
           <a:p>
             <a:pPr lvl="3"/>
             <a:r>
-              <a:rPr lang="en-US" smtClean="0"/>
+              <a:rPr lang="en-US"/>
               <a:t>Fourth level</a:t>
             </a:r>
           </a:p>
           <a:p>
             <a:pPr lvl="4"/>
             <a:r>
-              <a:rPr lang="en-US" smtClean="0"/>
+              <a:rPr lang="en-US"/>
               <a:t>Fifth level</a:t>
             </a:r>
             <a:endParaRPr lang="en-US" dirty="0"/>
@@ -2036,7 +2029,7 @@
           <a:p>
             <a:pPr lvl="0"/>
             <a:r>
-              <a:rPr lang="en-US" smtClean="0"/>
+              <a:rPr lang="en-US"/>
               <a:t>Click to edit Master text styles</a:t>
             </a:r>
           </a:p>
@@ -2092,38 +2085,37 @@
           <a:p>
             <a:pPr lvl="0"/>
             <a:r>
-              <a:rPr lang="en-US" smtClean="0"/>
+              <a:rPr lang="en-US"/>
               <a:t>Click to edit Master text styles</a:t>
             </a:r>
           </a:p>
           <a:p>
             <a:pPr lvl="1"/>
             <a:r>
-              <a:rPr lang="en-US" smtClean="0"/>
+              <a:rPr lang="en-US"/>
               <a:t>Second level</a:t>
             </a:r>
           </a:p>
           <a:p>
             <a:pPr lvl="2"/>
             <a:r>
-              <a:rPr lang="en-US" smtClean="0"/>
+              <a:rPr lang="en-US"/>
               <a:t>Third level</a:t>
             </a:r>
           </a:p>
           <a:p>
             <a:pPr lvl="3"/>
             <a:r>
-              <a:rPr lang="en-US" smtClean="0"/>
+              <a:rPr lang="en-US"/>
               <a:t>Fourth level</a:t>
             </a:r>
           </a:p>
           <a:p>
             <a:pPr lvl="4"/>
             <a:r>
-              <a:rPr lang="en-US" smtClean="0"/>
+              <a:rPr lang="en-US"/>
               <a:t>Fifth level</a:t>
             </a:r>
-            <a:endParaRPr lang="en-US"/>
           </a:p>
         </p:txBody>
       </p:sp>
@@ -2145,7 +2137,7 @@
             <a:fld id="{E3D07B0C-BD95-41BE-BB3E-AC75822DF381}" type="datetimeFigureOut">
               <a:rPr lang="en-US" smtClean="0"/>
               <a:pPr/>
-              <a:t>7/13/2015</a:t>
+              <a:t>4/21/2021</a:t>
             </a:fld>
             <a:endParaRPr lang="en-US"/>
           </a:p>
@@ -2235,10 +2227,9 @@
           <a:lstStyle/>
           <a:p>
             <a:r>
-              <a:rPr lang="en-US" smtClean="0"/>
+              <a:rPr lang="en-US"/>
               <a:t>Click to edit Master title style</a:t>
             </a:r>
-            <a:endParaRPr lang="en-US"/>
           </a:p>
         </p:txBody>
       </p:sp>
@@ -2260,7 +2251,7 @@
             <a:fld id="{E3D07B0C-BD95-41BE-BB3E-AC75822DF381}" type="datetimeFigureOut">
               <a:rPr lang="en-US" smtClean="0"/>
               <a:pPr/>
-              <a:t>7/13/2015</a:t>
+              <a:t>4/21/2021</a:t>
             </a:fld>
             <a:endParaRPr lang="en-US"/>
           </a:p>
@@ -2352,7 +2343,7 @@
             <a:fld id="{E3D07B0C-BD95-41BE-BB3E-AC75822DF381}" type="datetimeFigureOut">
               <a:rPr lang="en-US" smtClean="0"/>
               <a:pPr/>
-              <a:t>7/13/2015</a:t>
+              <a:t>4/21/2021</a:t>
             </a:fld>
             <a:endParaRPr lang="en-US"/>
           </a:p>
@@ -2451,7 +2442,7 @@
           </a:lstStyle>
           <a:p>
             <a:r>
-              <a:rPr lang="en-US" smtClean="0"/>
+              <a:rPr lang="en-US"/>
               <a:t>Click to edit Master title style</a:t>
             </a:r>
             <a:endParaRPr lang="en-US" dirty="0"/>
@@ -2519,7 +2510,7 @@
           <a:p>
             <a:pPr lvl="0"/>
             <a:r>
-              <a:rPr lang="en-US" smtClean="0"/>
+              <a:rPr lang="en-US"/>
               <a:t>Click to edit Master text styles</a:t>
             </a:r>
           </a:p>
@@ -2543,7 +2534,7 @@
             <a:fld id="{E3D07B0C-BD95-41BE-BB3E-AC75822DF381}" type="datetimeFigureOut">
               <a:rPr lang="en-US" smtClean="0"/>
               <a:pPr/>
-              <a:t>7/13/2015</a:t>
+              <a:t>4/21/2021</a:t>
             </a:fld>
             <a:endParaRPr lang="en-US"/>
           </a:p>
@@ -2614,38 +2605,37 @@
           <a:p>
             <a:pPr lvl="0"/>
             <a:r>
-              <a:rPr lang="en-US" smtClean="0"/>
+              <a:rPr lang="en-US"/>
               <a:t>Click to edit Master text styles</a:t>
             </a:r>
           </a:p>
           <a:p>
             <a:pPr lvl="1"/>
             <a:r>
-              <a:rPr lang="en-US" smtClean="0"/>
+              <a:rPr lang="en-US"/>
               <a:t>Second level</a:t>
             </a:r>
           </a:p>
           <a:p>
             <a:pPr lvl="2"/>
             <a:r>
-              <a:rPr lang="en-US" smtClean="0"/>
+              <a:rPr lang="en-US"/>
               <a:t>Third level</a:t>
             </a:r>
           </a:p>
           <a:p>
             <a:pPr lvl="3"/>
             <a:r>
-              <a:rPr lang="en-US" smtClean="0"/>
+              <a:rPr lang="en-US"/>
               <a:t>Fourth level</a:t>
             </a:r>
           </a:p>
           <a:p>
             <a:pPr lvl="4"/>
             <a:r>
-              <a:rPr lang="en-US" smtClean="0"/>
+              <a:rPr lang="en-US"/>
               <a:t>Fifth level</a:t>
             </a:r>
-            <a:endParaRPr lang="en-US"/>
           </a:p>
         </p:txBody>
       </p:sp>
@@ -2706,7 +2696,7 @@
           </a:lstStyle>
           <a:p>
             <a:r>
-              <a:rPr lang="en-US" smtClean="0"/>
+              <a:rPr lang="en-US"/>
               <a:t>Click to edit Master title style</a:t>
             </a:r>
             <a:endParaRPr lang="en-US" dirty="0"/>
@@ -2771,7 +2761,7 @@
           </a:lstStyle>
           <a:p>
             <a:r>
-              <a:rPr lang="en-US" smtClean="0"/>
+              <a:rPr lang="en-US"/>
               <a:t>Click icon to add picture</a:t>
             </a:r>
             <a:endParaRPr lang="en-US" dirty="0"/>
@@ -2839,7 +2829,7 @@
           <a:p>
             <a:pPr lvl="0"/>
             <a:r>
-              <a:rPr lang="en-US" smtClean="0"/>
+              <a:rPr lang="en-US"/>
               <a:t>Click to edit Master text styles</a:t>
             </a:r>
           </a:p>
@@ -2863,7 +2853,7 @@
             <a:fld id="{E3D07B0C-BD95-41BE-BB3E-AC75822DF381}" type="datetimeFigureOut">
               <a:rPr lang="en-US" smtClean="0"/>
               <a:pPr/>
-              <a:t>7/13/2015</a:t>
+              <a:t>4/21/2021</a:t>
             </a:fld>
             <a:endParaRPr lang="en-US"/>
           </a:p>
@@ -2968,7 +2958,7 @@
           <a:lstStyle/>
           <a:p>
             <a:r>
-              <a:rPr lang="en-US" smtClean="0"/>
+              <a:rPr lang="en-US"/>
               <a:t>Click to edit Master title style</a:t>
             </a:r>
             <a:endParaRPr lang="en-US" dirty="0"/>
@@ -3002,35 +2992,35 @@
           <a:p>
             <a:pPr lvl="0"/>
             <a:r>
-              <a:rPr lang="en-US" smtClean="0"/>
+              <a:rPr lang="en-US"/>
               <a:t>Click to edit Master text styles</a:t>
             </a:r>
           </a:p>
           <a:p>
             <a:pPr lvl="1"/>
             <a:r>
-              <a:rPr lang="en-US" smtClean="0"/>
+              <a:rPr lang="en-US"/>
               <a:t>Second level</a:t>
             </a:r>
           </a:p>
           <a:p>
             <a:pPr lvl="2"/>
             <a:r>
-              <a:rPr lang="en-US" smtClean="0"/>
+              <a:rPr lang="en-US"/>
               <a:t>Third level</a:t>
             </a:r>
           </a:p>
           <a:p>
             <a:pPr lvl="3"/>
             <a:r>
-              <a:rPr lang="en-US" smtClean="0"/>
+              <a:rPr lang="en-US"/>
               <a:t>Fourth level</a:t>
             </a:r>
           </a:p>
           <a:p>
             <a:pPr lvl="4"/>
             <a:r>
-              <a:rPr lang="en-US" smtClean="0"/>
+              <a:rPr lang="en-US"/>
               <a:t>Fifth level</a:t>
             </a:r>
             <a:endParaRPr lang="en-US" dirty="0"/>
@@ -3245,7 +3235,7 @@
             <a:fld id="{E3D07B0C-BD95-41BE-BB3E-AC75822DF381}" type="datetimeFigureOut">
               <a:rPr lang="en-US" smtClean="0"/>
               <a:pPr/>
-              <a:t>7/13/2015</a:t>
+              <a:t>4/21/2021</a:t>
             </a:fld>
             <a:endParaRPr lang="en-US"/>
           </a:p>
@@ -3616,7 +3606,7 @@
         <p:spPr>
           <a:xfrm>
             <a:off x="1187585" y="1513026"/>
-            <a:ext cx="4267200" cy="2324099"/>
+            <a:ext cx="4267200" cy="2525574"/>
           </a:xfrm>
           <a:prstGeom prst="rect">
             <a:avLst/>
@@ -3727,7 +3717,7 @@
             <a:lstStyle/>
             <a:p>
               <a:r>
-                <a:rPr lang="en-US" altLang="zh-TW" sz="800" dirty="0" smtClean="0"/>
+                <a:rPr lang="en-US" altLang="zh-TW" sz="800" dirty="0"/>
                 <a:t>Transform</a:t>
               </a:r>
               <a:endParaRPr lang="zh-TW" altLang="en-US" sz="800" dirty="0"/>
@@ -3821,7 +3811,7 @@
             <a:lstStyle/>
             <a:p>
               <a:r>
-                <a:rPr lang="en-US" altLang="zh-TW" sz="800" dirty="0" smtClean="0"/>
+                <a:rPr lang="en-US" altLang="zh-TW" sz="800" dirty="0"/>
                 <a:t>Camera</a:t>
               </a:r>
               <a:endParaRPr lang="zh-TW" altLang="en-US" sz="800" dirty="0"/>
@@ -3884,7 +3874,7 @@
         <p:grpSpPr>
           <a:xfrm>
             <a:off x="3838815" y="1578989"/>
-            <a:ext cx="929233" cy="215444"/>
+            <a:ext cx="580785" cy="215444"/>
             <a:chOff x="4173160" y="1367463"/>
             <a:chExt cx="929233" cy="215444"/>
           </a:xfrm>
@@ -3897,7 +3887,7 @@
           </p:nvSpPr>
           <p:spPr>
             <a:xfrm>
-              <a:off x="4206272" y="1367463"/>
+              <a:off x="4206273" y="1367463"/>
               <a:ext cx="863008" cy="215444"/>
             </a:xfrm>
             <a:prstGeom prst="rect">
@@ -3915,8 +3905,8 @@
             <a:lstStyle/>
             <a:p>
               <a:r>
-                <a:rPr lang="en-US" altLang="zh-TW" sz="800" dirty="0" err="1" smtClean="0"/>
-                <a:t>Engine_VertexBuffer</a:t>
+                <a:rPr lang="en-US" altLang="zh-TW" sz="800" dirty="0"/>
+                <a:t>vertexBuffer</a:t>
               </a:r>
               <a:endParaRPr lang="zh-TW" altLang="en-US" sz="800" dirty="0"/>
             </a:p>
@@ -4009,7 +3999,7 @@
             <a:lstStyle/>
             <a:p>
               <a:r>
-                <a:rPr lang="en-US" altLang="zh-TW" sz="800" dirty="0" smtClean="0"/>
+                <a:rPr lang="en-US" altLang="zh-TW" sz="800" dirty="0"/>
                 <a:t>Renderable</a:t>
               </a:r>
               <a:endParaRPr lang="zh-TW" altLang="en-US" sz="800" dirty="0"/>
@@ -4103,7 +4093,7 @@
             <a:lstStyle/>
             <a:p>
               <a:r>
-                <a:rPr lang="en-US" altLang="zh-TW" sz="800" dirty="0" smtClean="0"/>
+                <a:rPr lang="en-US" altLang="zh-TW" sz="800" dirty="0"/>
                 <a:t>Shader</a:t>
               </a:r>
               <a:endParaRPr lang="zh-TW" altLang="en-US" sz="800" dirty="0"/>
@@ -4165,10 +4155,10 @@
         </p:nvGrpSpPr>
         <p:grpSpPr>
           <a:xfrm>
-            <a:off x="2399338" y="2659456"/>
-            <a:ext cx="1223591" cy="500689"/>
-            <a:chOff x="2400882" y="2550469"/>
-            <a:chExt cx="1223591" cy="500689"/>
+            <a:off x="2276438" y="2672373"/>
+            <a:ext cx="1390291" cy="487772"/>
+            <a:chOff x="2350002" y="2563386"/>
+            <a:chExt cx="1274470" cy="487772"/>
           </a:xfrm>
         </p:grpSpPr>
         <p:grpSp>
@@ -4179,10 +4169,10 @@
           </p:nvGrpSpPr>
           <p:grpSpPr>
             <a:xfrm>
-              <a:off x="2400882" y="2550469"/>
-              <a:ext cx="822946" cy="215444"/>
-              <a:chOff x="2500082" y="2594287"/>
-              <a:chExt cx="822946" cy="215444"/>
+              <a:off x="2350002" y="2563386"/>
+              <a:ext cx="918692" cy="215444"/>
+              <a:chOff x="2449202" y="2607204"/>
+              <a:chExt cx="918692" cy="215444"/>
             </a:xfrm>
           </p:grpSpPr>
           <p:sp>
@@ -4193,8 +4183,8 @@
             </p:nvSpPr>
             <p:spPr>
               <a:xfrm>
-                <a:off x="2500082" y="2594287"/>
-                <a:ext cx="822946" cy="215444"/>
+                <a:off x="2449202" y="2607204"/>
+                <a:ext cx="918692" cy="215444"/>
               </a:xfrm>
               <a:prstGeom prst="rect">
                 <a:avLst/>
@@ -4212,8 +4202,8 @@
               <a:p>
                 <a:pPr algn="ctr"/>
                 <a:r>
-                  <a:rPr lang="en-US" altLang="zh-TW" sz="800" dirty="0" err="1" smtClean="0"/>
-                  <a:t>uModelTransform</a:t>
+                  <a:rPr lang="en-US" altLang="zh-TW" sz="800" dirty="0"/>
+                  <a:t>uModelXformMatrix</a:t>
                 </a:r>
                 <a:endParaRPr lang="zh-TW" altLang="en-US" sz="800" dirty="0"/>
               </a:p>
@@ -4274,10 +4264,10 @@
           </p:nvGrpSpPr>
           <p:grpSpPr>
             <a:xfrm>
-              <a:off x="2564816" y="2703418"/>
-              <a:ext cx="890114" cy="215444"/>
-              <a:chOff x="3014521" y="2887545"/>
-              <a:chExt cx="890114" cy="215444"/>
+              <a:off x="2509154" y="2704081"/>
+              <a:ext cx="987141" cy="215444"/>
+              <a:chOff x="2958859" y="2888208"/>
+              <a:chExt cx="987141" cy="215444"/>
             </a:xfrm>
           </p:grpSpPr>
           <p:sp>
@@ -4288,8 +4278,8 @@
             </p:nvSpPr>
             <p:spPr>
               <a:xfrm>
-                <a:off x="3018413" y="2887545"/>
-                <a:ext cx="884260" cy="215444"/>
+                <a:off x="2958859" y="2888208"/>
+                <a:ext cx="987141" cy="215444"/>
               </a:xfrm>
               <a:prstGeom prst="rect">
                 <a:avLst/>
@@ -4307,8 +4297,8 @@
               <a:p>
                 <a:pPr algn="ctr"/>
                 <a:r>
-                  <a:rPr lang="en-US" altLang="zh-TW" sz="800" dirty="0" err="1" smtClean="0"/>
-                  <a:t>uViewProjTransform</a:t>
+                  <a:rPr lang="en-US" altLang="zh-TW" sz="800" dirty="0"/>
+                  <a:t>uCameraXformMatrix</a:t>
                 </a:r>
                 <a:endParaRPr lang="zh-TW" altLang="en-US" sz="800" dirty="0"/>
               </a:p>
@@ -4369,10 +4359,10 @@
           </p:nvGrpSpPr>
           <p:grpSpPr>
             <a:xfrm>
-              <a:off x="2658529" y="2835714"/>
-              <a:ext cx="965944" cy="215444"/>
-              <a:chOff x="4533547" y="2579896"/>
-              <a:chExt cx="965944" cy="215444"/>
+              <a:off x="2546143" y="2835714"/>
+              <a:ext cx="1078329" cy="215444"/>
+              <a:chOff x="4421161" y="2579896"/>
+              <a:chExt cx="1078329" cy="215444"/>
             </a:xfrm>
           </p:grpSpPr>
           <p:sp>
@@ -4383,8 +4373,8 @@
             </p:nvSpPr>
             <p:spPr>
               <a:xfrm>
-                <a:off x="4533547" y="2579896"/>
-                <a:ext cx="965944" cy="215444"/>
+                <a:off x="4421161" y="2579896"/>
+                <a:ext cx="1078329" cy="215444"/>
               </a:xfrm>
               <a:prstGeom prst="rect">
                 <a:avLst/>
@@ -4402,8 +4392,8 @@
               <a:p>
                 <a:pPr algn="ctr"/>
                 <a:r>
-                  <a:rPr lang="en-US" altLang="zh-TW" sz="800" dirty="0" err="1" smtClean="0"/>
-                  <a:t>aSquareVertexPosition</a:t>
+                  <a:rPr lang="en-US" altLang="zh-TW" sz="800" dirty="0"/>
+                  <a:t>aVertexPosition</a:t>
                 </a:r>
                 <a:endParaRPr lang="zh-TW" altLang="en-US" sz="800" dirty="0"/>
               </a:p>
@@ -4497,7 +4487,7 @@
             <a:lstStyle/>
             <a:p>
               <a:r>
-                <a:rPr lang="en-US" altLang="zh-TW" sz="800" dirty="0" err="1" smtClean="0"/>
+                <a:rPr lang="en-US" altLang="zh-TW" sz="800" dirty="0"/>
                 <a:t>uPixelColor</a:t>
               </a:r>
               <a:endParaRPr lang="zh-TW" altLang="en-US" sz="800" dirty="0"/>
@@ -4976,7 +4966,7 @@
           <a:lstStyle/>
           <a:p>
             <a:r>
-              <a:rPr lang="en-US" altLang="zh-TW" sz="800" dirty="0" err="1" smtClean="0"/>
+              <a:rPr lang="en-US" altLang="zh-TW" sz="800" dirty="0"/>
               <a:t>WebGL</a:t>
             </a:r>
             <a:endParaRPr lang="zh-TW" altLang="en-US" sz="800" dirty="0"/>
@@ -5006,7 +4996,7 @@
           <a:lstStyle/>
           <a:p>
             <a:r>
-              <a:rPr lang="en-US" altLang="zh-TW" sz="800" dirty="0" smtClean="0"/>
+              <a:rPr lang="en-US" altLang="zh-TW" sz="800" dirty="0"/>
               <a:t>Game Engine</a:t>
             </a:r>
             <a:endParaRPr lang="zh-TW" altLang="en-US" sz="800" dirty="0"/>
@@ -5082,7 +5072,7 @@
           <a:lstStyle/>
           <a:p>
             <a:r>
-              <a:rPr lang="en-US" altLang="zh-TW" sz="800" dirty="0" err="1" smtClean="0"/>
+              <a:rPr lang="en-US" altLang="zh-TW" sz="800" dirty="0"/>
               <a:t>SimpeVS</a:t>
             </a:r>
             <a:endParaRPr lang="zh-TW" altLang="en-US" sz="800" dirty="0"/>
@@ -5112,7 +5102,7 @@
           <a:lstStyle/>
           <a:p>
             <a:r>
-              <a:rPr lang="en-US" altLang="zh-TW" sz="800" dirty="0" err="1" smtClean="0"/>
+              <a:rPr lang="en-US" altLang="zh-TW" sz="800" dirty="0"/>
               <a:t>SimpleFS</a:t>
             </a:r>
             <a:endParaRPr lang="zh-TW" altLang="en-US" sz="800" dirty="0"/>
@@ -5127,7 +5117,7 @@
         </p:nvSpPr>
         <p:spPr>
           <a:xfrm>
-            <a:off x="4235695" y="1982884"/>
+            <a:off x="4047915" y="2000649"/>
             <a:ext cx="770954" cy="338554"/>
           </a:xfrm>
           <a:prstGeom prst="rect">
@@ -5143,19 +5133,15 @@
           <a:p>
             <a:pPr algn="ctr"/>
             <a:r>
-              <a:rPr lang="en-US" altLang="zh-TW" sz="800" dirty="0" smtClean="0"/>
+              <a:rPr lang="en-US" altLang="zh-TW" sz="800" dirty="0"/>
               <a:t>global access</a:t>
             </a:r>
           </a:p>
           <a:p>
             <a:pPr algn="ctr"/>
             <a:r>
-              <a:rPr lang="en-US" altLang="zh-TW" sz="800" dirty="0" err="1" smtClean="0"/>
-              <a:t>getGLVertexRef</a:t>
-            </a:r>
-            <a:r>
-              <a:rPr lang="en-US" altLang="zh-TW" sz="800" dirty="0" smtClean="0"/>
-              <a:t>()</a:t>
+              <a:rPr lang="en-US" altLang="zh-TW" sz="800" dirty="0"/>
+              <a:t>get ()</a:t>
             </a:r>
             <a:endParaRPr lang="zh-TW" altLang="en-US" sz="800" dirty="0"/>
           </a:p>
@@ -5185,46 +5171,8 @@
           <a:p>
             <a:pPr algn="ctr"/>
             <a:r>
-              <a:rPr lang="en-US" altLang="zh-TW" sz="800" dirty="0" err="1" smtClean="0"/>
-              <a:t>activateShader</a:t>
-            </a:r>
-            <a:r>
-              <a:rPr lang="en-US" altLang="zh-TW" sz="800" dirty="0" smtClean="0"/>
-              <a:t>()</a:t>
-            </a:r>
-          </a:p>
-        </p:txBody>
-      </p:sp>
-      <p:sp>
-        <p:nvSpPr>
-          <p:cNvPr id="156" name="TextBox 155"/>
-          <p:cNvSpPr txBox="1"/>
-          <p:nvPr/>
-        </p:nvSpPr>
-        <p:spPr>
-          <a:xfrm>
-            <a:off x="1828800" y="1854113"/>
-            <a:ext cx="911833" cy="215444"/>
-          </a:xfrm>
-          <a:prstGeom prst="rect">
-            <a:avLst/>
-          </a:prstGeom>
-          <a:noFill/>
-        </p:spPr>
-        <p:txBody>
-          <a:bodyPr wrap="square" lIns="0" rIns="0" rtlCol="0">
-            <a:spAutoFit/>
-          </a:bodyPr>
-          <a:lstStyle/>
-          <a:p>
-            <a:pPr algn="ctr"/>
-            <a:r>
-              <a:rPr lang="en-US" altLang="zh-TW" sz="800" dirty="0" err="1" smtClean="0"/>
-              <a:t>loadObjectTransform</a:t>
-            </a:r>
-            <a:r>
-              <a:rPr lang="en-US" altLang="zh-TW" sz="800" dirty="0" smtClean="0"/>
-              <a:t>()</a:t>
+              <a:rPr lang="en-US" altLang="zh-TW" sz="800" dirty="0"/>
+              <a:t>activateShader()</a:t>
             </a:r>
           </a:p>
         </p:txBody>
@@ -5238,7 +5186,7 @@
         <p:spPr>
           <a:xfrm>
             <a:off x="3985689" y="1854113"/>
-            <a:ext cx="635483" cy="166091"/>
+            <a:ext cx="526283" cy="215428"/>
           </a:xfrm>
           <a:custGeom>
             <a:avLst/>
@@ -5462,8 +5410,8 @@
         </p:nvSpPr>
         <p:spPr>
           <a:xfrm>
-            <a:off x="2765986" y="1959585"/>
-            <a:ext cx="384880" cy="142281"/>
+            <a:off x="2670736" y="2075019"/>
+            <a:ext cx="480130" cy="150037"/>
           </a:xfrm>
           <a:custGeom>
             <a:avLst/>
@@ -5704,6 +5652,70 @@
               <a:gd name="connsiteY2" fmla="*/ 47833 h 142281"/>
               <a:gd name="connsiteX3" fmla="*/ 0 w 384880"/>
               <a:gd name="connsiteY3" fmla="*/ 0 h 142281"/>
+              <a:gd name="connsiteX0" fmla="*/ 480130 w 480130"/>
+              <a:gd name="connsiteY0" fmla="*/ 69150 h 216634"/>
+              <a:gd name="connsiteX1" fmla="*/ 197724 w 480130"/>
+              <a:gd name="connsiteY1" fmla="*/ 95998 h 216634"/>
+              <a:gd name="connsiteX2" fmla="*/ 199934 w 480130"/>
+              <a:gd name="connsiteY2" fmla="*/ 1550 h 216634"/>
+              <a:gd name="connsiteX3" fmla="*/ 0 w 480130"/>
+              <a:gd name="connsiteY3" fmla="*/ 215655 h 216634"/>
+              <a:gd name="connsiteX0" fmla="*/ 480130 w 480130"/>
+              <a:gd name="connsiteY0" fmla="*/ 69150 h 216634"/>
+              <a:gd name="connsiteX1" fmla="*/ 328693 w 480130"/>
+              <a:gd name="connsiteY1" fmla="*/ 88854 h 216634"/>
+              <a:gd name="connsiteX2" fmla="*/ 199934 w 480130"/>
+              <a:gd name="connsiteY2" fmla="*/ 1550 h 216634"/>
+              <a:gd name="connsiteX3" fmla="*/ 0 w 480130"/>
+              <a:gd name="connsiteY3" fmla="*/ 215655 h 216634"/>
+              <a:gd name="connsiteX0" fmla="*/ 480130 w 480130"/>
+              <a:gd name="connsiteY0" fmla="*/ 0 h 148922"/>
+              <a:gd name="connsiteX1" fmla="*/ 328693 w 480130"/>
+              <a:gd name="connsiteY1" fmla="*/ 19704 h 148922"/>
+              <a:gd name="connsiteX2" fmla="*/ 218984 w 480130"/>
+              <a:gd name="connsiteY2" fmla="*/ 91944 h 148922"/>
+              <a:gd name="connsiteX3" fmla="*/ 0 w 480130"/>
+              <a:gd name="connsiteY3" fmla="*/ 146505 h 148922"/>
+              <a:gd name="connsiteX0" fmla="*/ 480130 w 480130"/>
+              <a:gd name="connsiteY0" fmla="*/ 0 h 149655"/>
+              <a:gd name="connsiteX1" fmla="*/ 328693 w 480130"/>
+              <a:gd name="connsiteY1" fmla="*/ 19704 h 149655"/>
+              <a:gd name="connsiteX2" fmla="*/ 218984 w 480130"/>
+              <a:gd name="connsiteY2" fmla="*/ 91944 h 149655"/>
+              <a:gd name="connsiteX3" fmla="*/ 0 w 480130"/>
+              <a:gd name="connsiteY3" fmla="*/ 146505 h 149655"/>
+              <a:gd name="connsiteX0" fmla="*/ 480130 w 480130"/>
+              <a:gd name="connsiteY0" fmla="*/ 0 h 149655"/>
+              <a:gd name="connsiteX1" fmla="*/ 328693 w 480130"/>
+              <a:gd name="connsiteY1" fmla="*/ 19704 h 149655"/>
+              <a:gd name="connsiteX2" fmla="*/ 218984 w 480130"/>
+              <a:gd name="connsiteY2" fmla="*/ 91944 h 149655"/>
+              <a:gd name="connsiteX3" fmla="*/ 0 w 480130"/>
+              <a:gd name="connsiteY3" fmla="*/ 146505 h 149655"/>
+              <a:gd name="connsiteX0" fmla="*/ 480130 w 480130"/>
+              <a:gd name="connsiteY0" fmla="*/ 0 h 149655"/>
+              <a:gd name="connsiteX1" fmla="*/ 328693 w 480130"/>
+              <a:gd name="connsiteY1" fmla="*/ 19704 h 149655"/>
+              <a:gd name="connsiteX2" fmla="*/ 218984 w 480130"/>
+              <a:gd name="connsiteY2" fmla="*/ 91944 h 149655"/>
+              <a:gd name="connsiteX3" fmla="*/ 0 w 480130"/>
+              <a:gd name="connsiteY3" fmla="*/ 146505 h 149655"/>
+              <a:gd name="connsiteX0" fmla="*/ 480130 w 480130"/>
+              <a:gd name="connsiteY0" fmla="*/ 0 h 150037"/>
+              <a:gd name="connsiteX1" fmla="*/ 328693 w 480130"/>
+              <a:gd name="connsiteY1" fmla="*/ 19704 h 150037"/>
+              <a:gd name="connsiteX2" fmla="*/ 218984 w 480130"/>
+              <a:gd name="connsiteY2" fmla="*/ 91944 h 150037"/>
+              <a:gd name="connsiteX3" fmla="*/ 0 w 480130"/>
+              <a:gd name="connsiteY3" fmla="*/ 146505 h 150037"/>
+              <a:gd name="connsiteX0" fmla="*/ 480130 w 480130"/>
+              <a:gd name="connsiteY0" fmla="*/ 0 h 150037"/>
+              <a:gd name="connsiteX1" fmla="*/ 328693 w 480130"/>
+              <a:gd name="connsiteY1" fmla="*/ 19704 h 150037"/>
+              <a:gd name="connsiteX2" fmla="*/ 218984 w 480130"/>
+              <a:gd name="connsiteY2" fmla="*/ 91944 h 150037"/>
+              <a:gd name="connsiteX3" fmla="*/ 0 w 480130"/>
+              <a:gd name="connsiteY3" fmla="*/ 146505 h 150037"/>
             </a:gdLst>
             <a:ahLst/>
             <a:cxnLst>
@@ -5722,22 +5734,22 @@
             </a:cxnLst>
             <a:rect l="l" t="t" r="r" b="b"/>
             <a:pathLst>
-              <a:path w="384880" h="142281">
+              <a:path w="480130" h="150037">
                 <a:moveTo>
-                  <a:pt x="384880" y="115433"/>
+                  <a:pt x="480130" y="0"/>
                 </a:moveTo>
                 <a:lnTo>
-                  <a:pt x="102474" y="142281"/>
+                  <a:pt x="328693" y="19704"/>
                 </a:lnTo>
                 <a:cubicBezTo>
-                  <a:pt x="36568" y="140618"/>
-                  <a:pt x="121763" y="71546"/>
-                  <a:pt x="104684" y="47833"/>
+                  <a:pt x="262787" y="37091"/>
+                  <a:pt x="300356" y="75176"/>
+                  <a:pt x="218984" y="91944"/>
                 </a:cubicBezTo>
                 <a:cubicBezTo>
-                  <a:pt x="87605" y="24120"/>
-                  <a:pt x="69515" y="18732"/>
-                  <a:pt x="0" y="0"/>
+                  <a:pt x="135230" y="103950"/>
+                  <a:pt x="69515" y="165237"/>
+                  <a:pt x="0" y="146505"/>
                 </a:cubicBezTo>
               </a:path>
             </a:pathLst>
@@ -6868,7 +6880,7 @@
           <a:lstStyle/>
           <a:p>
             <a:r>
-              <a:rPr lang="en-US" altLang="zh-TW" sz="800" dirty="0" smtClean="0"/>
+              <a:rPr lang="en-US" altLang="zh-TW" sz="800" dirty="0"/>
               <a:t>per Vertex</a:t>
             </a:r>
             <a:endParaRPr lang="zh-TW" altLang="en-US" sz="800" dirty="0"/>
@@ -6898,7 +6910,7 @@
           <a:lstStyle/>
           <a:p>
             <a:r>
-              <a:rPr lang="en-US" altLang="zh-TW" sz="800" dirty="0" smtClean="0"/>
+              <a:rPr lang="en-US" altLang="zh-TW" sz="800" dirty="0"/>
               <a:t>per Pixel</a:t>
             </a:r>
             <a:endParaRPr lang="zh-TW" altLang="en-US" sz="800" dirty="0"/>
@@ -6992,8 +7004,8 @@
         </p:nvSpPr>
         <p:spPr>
           <a:xfrm>
-            <a:off x="1459064" y="1506767"/>
-            <a:ext cx="4267200" cy="2324099"/>
+            <a:off x="1459064" y="1371600"/>
+            <a:ext cx="4267200" cy="2819399"/>
           </a:xfrm>
           <a:prstGeom prst="rect">
             <a:avLst/>
@@ -7104,7 +7116,7 @@
             <a:lstStyle/>
             <a:p>
               <a:r>
-                <a:rPr lang="en-US" altLang="zh-TW" sz="800" dirty="0" smtClean="0"/>
+                <a:rPr lang="en-US" altLang="zh-TW" sz="800" dirty="0"/>
                 <a:t>Transform</a:t>
               </a:r>
               <a:endParaRPr lang="zh-TW" altLang="en-US" sz="800" dirty="0"/>
@@ -7199,7 +7211,7 @@
             <a:p>
               <a:pPr algn="ctr"/>
               <a:r>
-                <a:rPr lang="en-US" altLang="zh-TW" sz="800" dirty="0" smtClean="0"/>
+                <a:rPr lang="en-US" altLang="zh-TW" sz="800" dirty="0"/>
                 <a:t>Camera</a:t>
               </a:r>
               <a:endParaRPr lang="zh-TW" altLang="en-US" sz="800" dirty="0"/>
@@ -7261,9 +7273,9 @@
         </p:nvGrpSpPr>
         <p:grpSpPr>
           <a:xfrm>
-            <a:off x="3797434" y="1454879"/>
-            <a:ext cx="929233" cy="215444"/>
-            <a:chOff x="4173160" y="1371600"/>
+            <a:off x="3797435" y="1454823"/>
+            <a:ext cx="604716" cy="215444"/>
+            <a:chOff x="4173160" y="1371544"/>
             <a:chExt cx="929233" cy="215444"/>
           </a:xfrm>
         </p:grpSpPr>
@@ -7275,7 +7287,7 @@
           </p:nvSpPr>
           <p:spPr>
             <a:xfrm>
-              <a:off x="4198810" y="1371600"/>
+              <a:off x="4214053" y="1371544"/>
               <a:ext cx="877932" cy="215444"/>
             </a:xfrm>
             <a:prstGeom prst="rect">
@@ -7293,8 +7305,8 @@
             <a:lstStyle/>
             <a:p>
               <a:r>
-                <a:rPr lang="en-US" altLang="zh-TW" sz="800" dirty="0" err="1" smtClean="0"/>
-                <a:t>Engine_VertexBuffer</a:t>
+                <a:rPr lang="en-US" altLang="zh-TW" sz="800" dirty="0"/>
+                <a:t>vertexBuffer</a:t>
               </a:r>
               <a:endParaRPr lang="zh-TW" altLang="en-US" sz="800" dirty="0"/>
             </a:p>
@@ -7387,7 +7399,7 @@
             <a:lstStyle/>
             <a:p>
               <a:r>
-                <a:rPr lang="en-US" altLang="zh-TW" sz="800" dirty="0" smtClean="0"/>
+                <a:rPr lang="en-US" altLang="zh-TW" sz="800" dirty="0"/>
                 <a:t>Renderable</a:t>
               </a:r>
               <a:endParaRPr lang="zh-TW" altLang="en-US" sz="800" dirty="0"/>
@@ -7481,7 +7493,7 @@
             <a:lstStyle/>
             <a:p>
               <a:r>
-                <a:rPr lang="en-US" altLang="zh-TW" sz="800" dirty="0" smtClean="0"/>
+                <a:rPr lang="en-US" altLang="zh-TW" sz="800" dirty="0"/>
                 <a:t>Shader</a:t>
               </a:r>
               <a:endParaRPr lang="zh-TW" altLang="en-US" sz="800" dirty="0"/>
@@ -7608,7 +7620,7 @@
           <a:lstStyle/>
           <a:p>
             <a:r>
-              <a:rPr lang="en-US" altLang="zh-TW" sz="800" dirty="0" err="1" smtClean="0"/>
+              <a:rPr lang="en-US" altLang="zh-TW" sz="800" dirty="0"/>
               <a:t>WebGL</a:t>
             </a:r>
             <a:endParaRPr lang="zh-TW" altLang="en-US" sz="800" dirty="0"/>
@@ -7638,7 +7650,7 @@
           <a:lstStyle/>
           <a:p>
             <a:r>
-              <a:rPr lang="en-US" altLang="zh-TW" sz="800" dirty="0" smtClean="0"/>
+              <a:rPr lang="en-US" altLang="zh-TW" sz="800" dirty="0"/>
               <a:t>Game Engine</a:t>
             </a:r>
             <a:endParaRPr lang="zh-TW" altLang="en-US" sz="800" dirty="0"/>
@@ -7714,7 +7726,7 @@
           <a:lstStyle/>
           <a:p>
             <a:r>
-              <a:rPr lang="en-US" altLang="zh-TW" sz="800" dirty="0" err="1" smtClean="0"/>
+              <a:rPr lang="en-US" altLang="zh-TW" sz="800" dirty="0"/>
               <a:t>TextureVS</a:t>
             </a:r>
             <a:endParaRPr lang="zh-TW" altLang="en-US" sz="800" dirty="0"/>
@@ -7744,7 +7756,7 @@
           <a:lstStyle/>
           <a:p>
             <a:r>
-              <a:rPr lang="en-US" altLang="zh-TW" sz="800" dirty="0" err="1" smtClean="0"/>
+              <a:rPr lang="en-US" altLang="zh-TW" sz="800" dirty="0"/>
               <a:t>TextureFS</a:t>
             </a:r>
             <a:endParaRPr lang="zh-TW" altLang="en-US" sz="800" dirty="0"/>
@@ -7759,7 +7771,7 @@
         </p:nvSpPr>
         <p:spPr>
           <a:xfrm>
-            <a:off x="4552969" y="2047078"/>
+            <a:off x="4461283" y="2046963"/>
             <a:ext cx="873763" cy="338554"/>
           </a:xfrm>
           <a:prstGeom prst="rect">
@@ -7775,19 +7787,15 @@
           <a:p>
             <a:pPr algn="ctr"/>
             <a:r>
-              <a:rPr lang="en-US" altLang="zh-TW" sz="800" dirty="0" smtClean="0"/>
+              <a:rPr lang="en-US" altLang="zh-TW" sz="800" dirty="0"/>
               <a:t>global access</a:t>
             </a:r>
           </a:p>
           <a:p>
             <a:pPr algn="ctr"/>
             <a:r>
-              <a:rPr lang="en-US" altLang="zh-TW" sz="800" dirty="0" err="1" smtClean="0"/>
-              <a:t>getGLTexCoordRef</a:t>
-            </a:r>
-            <a:r>
-              <a:rPr lang="en-US" altLang="zh-TW" sz="800" dirty="0" smtClean="0"/>
-              <a:t>()</a:t>
+              <a:rPr lang="en-US" altLang="zh-TW" sz="800" dirty="0"/>
+              <a:t>get ()</a:t>
             </a:r>
             <a:endParaRPr lang="zh-TW" altLang="en-US" sz="800" dirty="0"/>
           </a:p>
@@ -7801,7 +7809,7 @@
         </p:nvSpPr>
         <p:spPr>
           <a:xfrm>
-            <a:off x="4641481" y="1769942"/>
+            <a:off x="4451527" y="1773097"/>
             <a:ext cx="696741" cy="215444"/>
           </a:xfrm>
           <a:prstGeom prst="rect">
@@ -7817,12 +7825,8 @@
           <a:p>
             <a:pPr algn="ctr"/>
             <a:r>
-              <a:rPr lang="en-US" altLang="zh-TW" sz="800" dirty="0" err="1" smtClean="0"/>
-              <a:t>activateTexture</a:t>
-            </a:r>
-            <a:r>
-              <a:rPr lang="en-US" altLang="zh-TW" sz="800" dirty="0" smtClean="0"/>
-              <a:t>()</a:t>
+              <a:rPr lang="en-US" altLang="zh-TW" sz="800" dirty="0"/>
+              <a:t>activate()</a:t>
             </a:r>
           </a:p>
         </p:txBody>
@@ -8238,9 +8242,9 @@
         </p:nvGrpSpPr>
         <p:grpSpPr>
           <a:xfrm>
-            <a:off x="4775538" y="1454879"/>
-            <a:ext cx="731671" cy="215444"/>
-            <a:chOff x="4173161" y="1367463"/>
+            <a:off x="4465732" y="1454879"/>
+            <a:ext cx="338636" cy="215444"/>
+            <a:chOff x="3863354" y="1367463"/>
             <a:chExt cx="731671" cy="215444"/>
           </a:xfrm>
         </p:grpSpPr>
@@ -8252,7 +8256,7 @@
           </p:nvSpPr>
           <p:spPr>
             <a:xfrm>
-              <a:off x="4188568" y="1367463"/>
+              <a:off x="3878761" y="1367463"/>
               <a:ext cx="700856" cy="215444"/>
             </a:xfrm>
             <a:prstGeom prst="rect">
@@ -8270,8 +8274,8 @@
             <a:lstStyle/>
             <a:p>
               <a:r>
-                <a:rPr lang="en-US" altLang="zh-TW" sz="800" dirty="0" err="1" smtClean="0"/>
-                <a:t>Engine_Textures</a:t>
+                <a:rPr lang="en-US" altLang="zh-TW" sz="800" dirty="0"/>
+                <a:t>texture</a:t>
               </a:r>
               <a:endParaRPr lang="zh-TW" altLang="en-US" sz="800" dirty="0"/>
             </a:p>
@@ -8285,7 +8289,7 @@
           </p:nvSpPr>
           <p:spPr>
             <a:xfrm>
-              <a:off x="4173161" y="1406605"/>
+              <a:off x="3863354" y="1406605"/>
               <a:ext cx="731671" cy="137160"/>
             </a:xfrm>
             <a:prstGeom prst="rect">
@@ -8364,7 +8368,7 @@
             <a:lstStyle/>
             <a:p>
               <a:r>
-                <a:rPr lang="en-US" altLang="zh-TW" sz="800" dirty="0" err="1" smtClean="0"/>
+                <a:rPr lang="en-US" altLang="zh-TW" sz="800" dirty="0"/>
                 <a:t>aTextureCoordinate</a:t>
               </a:r>
               <a:endParaRPr lang="zh-TW" altLang="en-US" sz="800" dirty="0"/>
@@ -8458,7 +8462,7 @@
             <a:lstStyle/>
             <a:p>
               <a:r>
-                <a:rPr lang="en-US" altLang="zh-TW" sz="800" dirty="0" err="1" smtClean="0"/>
+                <a:rPr lang="en-US" altLang="zh-TW" sz="800" dirty="0"/>
                 <a:t>uSampler</a:t>
               </a:r>
               <a:endParaRPr lang="zh-TW" altLang="en-US" sz="800" dirty="0"/>
@@ -8552,7 +8556,7 @@
             <a:lstStyle/>
             <a:p>
               <a:r>
-                <a:rPr lang="en-US" altLang="zh-TW" sz="800" dirty="0" err="1" smtClean="0"/>
+                <a:rPr lang="en-US" altLang="zh-TW" sz="800" dirty="0"/>
                 <a:t>vTexCoord</a:t>
               </a:r>
               <a:endParaRPr lang="zh-TW" altLang="en-US" sz="800" dirty="0"/>
@@ -8806,7 +8810,7 @@
             <a:lstStyle/>
             <a:p>
               <a:r>
-                <a:rPr lang="en-US" altLang="zh-TW" sz="700" dirty="0" smtClean="0">
+                <a:rPr lang="en-US" altLang="zh-TW" sz="700" dirty="0">
                   <a:solidFill>
                     <a:schemeClr val="bg1">
                       <a:lumMod val="50000"/>
@@ -8818,7 +8822,7 @@
             </a:p>
             <a:p>
               <a:r>
-                <a:rPr lang="en-US" altLang="zh-TW" sz="700" dirty="0" err="1" smtClean="0">
+                <a:rPr lang="en-US" altLang="zh-TW" sz="700" dirty="0">
                   <a:solidFill>
                     <a:schemeClr val="bg1">
                       <a:lumMod val="50000"/>
@@ -8910,7 +8914,7 @@
           <a:lstStyle/>
           <a:p>
             <a:r>
-              <a:rPr lang="en-US" altLang="zh-TW" sz="800" dirty="0" smtClean="0"/>
+              <a:rPr lang="en-US" altLang="zh-TW" sz="800" dirty="0"/>
               <a:t>per Vertex</a:t>
             </a:r>
             <a:endParaRPr lang="zh-TW" altLang="en-US" sz="800" dirty="0"/>
@@ -8940,7 +8944,7 @@
           <a:lstStyle/>
           <a:p>
             <a:r>
-              <a:rPr lang="en-US" altLang="zh-TW" sz="800" dirty="0" smtClean="0"/>
+              <a:rPr lang="en-US" altLang="zh-TW" sz="800" dirty="0"/>
               <a:t>per Pixel</a:t>
             </a:r>
             <a:endParaRPr lang="zh-TW" altLang="en-US" sz="800" dirty="0"/>
@@ -8970,24 +8974,14 @@
           <a:lstStyle/>
           <a:p>
             <a:r>
-              <a:rPr lang="en-US" altLang="zh-TW" sz="700" dirty="0" smtClean="0">
+              <a:rPr lang="en-US" altLang="zh-TW" sz="700" dirty="0">
                 <a:solidFill>
                   <a:schemeClr val="bg1">
                     <a:lumMod val="50000"/>
                   </a:schemeClr>
                 </a:solidFill>
               </a:rPr>
-              <a:t>from </a:t>
-            </a:r>
-            <a:r>
-              <a:rPr lang="en-US" altLang="zh-TW" sz="700" dirty="0" err="1" smtClean="0">
-                <a:solidFill>
-                  <a:schemeClr val="bg1">
-                    <a:lumMod val="50000"/>
-                  </a:schemeClr>
-                </a:solidFill>
-              </a:rPr>
-              <a:t>SimpleFS</a:t>
+              <a:t>from SimpleFS</a:t>
             </a:r>
             <a:endParaRPr lang="zh-TW" altLang="en-US" sz="700" dirty="0">
               <a:solidFill>
@@ -9071,7 +9065,7 @@
           <a:lstStyle/>
           <a:p>
             <a:r>
-              <a:rPr lang="en-US" altLang="zh-TW" sz="800" dirty="0" err="1" smtClean="0"/>
+              <a:rPr lang="en-US" altLang="zh-TW" sz="800" dirty="0"/>
               <a:t>TextureRenderable</a:t>
             </a:r>
             <a:endParaRPr lang="zh-TW" altLang="en-US" sz="800" dirty="0"/>
@@ -9150,7 +9144,7 @@
           <a:lstStyle/>
           <a:p>
             <a:r>
-              <a:rPr lang="en-US" altLang="zh-TW" sz="800" dirty="0" err="1" smtClean="0"/>
+              <a:rPr lang="en-US" altLang="zh-TW" sz="800" dirty="0"/>
               <a:t>TextureShader</a:t>
             </a:r>
             <a:endParaRPr lang="zh-TW" altLang="en-US" sz="800" dirty="0"/>
@@ -9288,7 +9282,7 @@
         </p:nvCxnSpPr>
         <p:spPr>
           <a:xfrm rot="5400000">
-            <a:off x="3528542" y="2029191"/>
+            <a:off x="3028502" y="2029191"/>
             <a:ext cx="1987882" cy="1191862"/>
           </a:xfrm>
           <a:prstGeom prst="bentConnector3">
@@ -9368,40 +9362,6 @@
       </p:sp>
       <p:sp>
         <p:nvSpPr>
-          <p:cNvPr id="145" name="TextBox 144"/>
-          <p:cNvSpPr txBox="1"/>
-          <p:nvPr/>
-        </p:nvSpPr>
-        <p:spPr>
-          <a:xfrm>
-            <a:off x="2478850" y="3200138"/>
-            <a:ext cx="1335672" cy="215444"/>
-          </a:xfrm>
-          <a:prstGeom prst="rect">
-            <a:avLst/>
-          </a:prstGeom>
-          <a:noFill/>
-        </p:spPr>
-        <p:txBody>
-          <a:bodyPr wrap="square" lIns="0" rIns="0" rtlCol="0">
-            <a:spAutoFit/>
-          </a:bodyPr>
-          <a:lstStyle/>
-          <a:p>
-            <a:r>
-              <a:rPr lang="en-US" altLang="zh-TW" sz="800" dirty="0" smtClean="0"/>
-              <a:t>graphics hardware </a:t>
-            </a:r>
-            <a:r>
-              <a:rPr lang="en-US" altLang="zh-TW" sz="800" dirty="0" err="1" smtClean="0"/>
-              <a:t>intepolation</a:t>
-            </a:r>
-            <a:endParaRPr lang="zh-TW" altLang="en-US" sz="800" dirty="0"/>
-          </a:p>
-        </p:txBody>
-      </p:sp>
-      <p:sp>
-        <p:nvSpPr>
           <p:cNvPr id="150" name="Isosceles Triangle 149"/>
           <p:cNvSpPr/>
           <p:nvPr/>
@@ -9454,7 +9414,7 @@
         </p:nvSpPr>
         <p:spPr>
           <a:xfrm rot="11274455">
-            <a:off x="5143158" y="1708962"/>
+            <a:off x="4632894" y="1714602"/>
             <a:ext cx="122360" cy="103751"/>
           </a:xfrm>
           <a:custGeom>
@@ -9923,6 +9883,36 @@
           </a:fontRef>
         </p:style>
       </p:cxnSp>
+      <p:sp>
+        <p:nvSpPr>
+          <p:cNvPr id="145" name="TextBox 144"/>
+          <p:cNvSpPr txBox="1"/>
+          <p:nvPr/>
+        </p:nvSpPr>
+        <p:spPr>
+          <a:xfrm>
+            <a:off x="2478850" y="3200138"/>
+            <a:ext cx="1335672" cy="215444"/>
+          </a:xfrm>
+          <a:prstGeom prst="rect">
+            <a:avLst/>
+          </a:prstGeom>
+          <a:noFill/>
+        </p:spPr>
+        <p:txBody>
+          <a:bodyPr wrap="square" lIns="0" rIns="0" rtlCol="0">
+            <a:spAutoFit/>
+          </a:bodyPr>
+          <a:lstStyle/>
+          <a:p>
+            <a:r>
+              <a:rPr lang="en-US" altLang="zh-TW" sz="800" dirty="0"/>
+              <a:t>graphics hardware interpolation</a:t>
+            </a:r>
+            <a:endParaRPr lang="zh-TW" altLang="en-US" sz="800" dirty="0"/>
+          </a:p>
+        </p:txBody>
+      </p:sp>
     </p:spTree>
     <p:extLst>
       <p:ext uri="{BB962C8B-B14F-4D97-AF65-F5344CB8AC3E}">
@@ -10073,7 +10063,7 @@
             <a:lstStyle/>
             <a:p>
               <a:r>
-                <a:rPr lang="en-US" altLang="zh-TW" sz="800" dirty="0" smtClean="0"/>
+                <a:rPr lang="en-US" altLang="zh-TW" sz="800" dirty="0"/>
                 <a:t>Transform</a:t>
               </a:r>
               <a:endParaRPr lang="zh-TW" altLang="en-US" sz="800" dirty="0"/>
@@ -10168,7 +10158,7 @@
             <a:p>
               <a:pPr algn="ctr"/>
               <a:r>
-                <a:rPr lang="en-US" altLang="zh-TW" sz="800" dirty="0" smtClean="0"/>
+                <a:rPr lang="en-US" altLang="zh-TW" sz="800" dirty="0"/>
                 <a:t>Camera</a:t>
               </a:r>
               <a:endParaRPr lang="zh-TW" altLang="en-US" sz="800" dirty="0"/>
@@ -10262,7 +10252,7 @@
             <a:lstStyle/>
             <a:p>
               <a:r>
-                <a:rPr lang="en-US" altLang="zh-TW" sz="800" dirty="0" err="1" smtClean="0"/>
+                <a:rPr lang="en-US" altLang="zh-TW" sz="800" dirty="0" err="1"/>
                 <a:t>Engine_VertexBuffer</a:t>
               </a:r>
               <a:endParaRPr lang="zh-TW" altLang="en-US" sz="800" dirty="0"/>
@@ -10356,7 +10346,7 @@
             <a:lstStyle/>
             <a:p>
               <a:r>
-                <a:rPr lang="en-US" altLang="zh-TW" sz="800" dirty="0" smtClean="0"/>
+                <a:rPr lang="en-US" altLang="zh-TW" sz="800" dirty="0"/>
                 <a:t>Renderable</a:t>
               </a:r>
               <a:endParaRPr lang="zh-TW" altLang="en-US" sz="800" dirty="0"/>
@@ -10450,7 +10440,7 @@
             <a:lstStyle/>
             <a:p>
               <a:r>
-                <a:rPr lang="en-US" altLang="zh-TW" sz="800" dirty="0" smtClean="0"/>
+                <a:rPr lang="en-US" altLang="zh-TW" sz="800" dirty="0"/>
                 <a:t>Shader</a:t>
               </a:r>
               <a:endParaRPr lang="zh-TW" altLang="en-US" sz="800" dirty="0"/>
@@ -10527,7 +10517,7 @@
           <a:lstStyle/>
           <a:p>
             <a:r>
-              <a:rPr lang="en-US" altLang="zh-TW" sz="800" dirty="0" err="1" smtClean="0"/>
+              <a:rPr lang="en-US" altLang="zh-TW" sz="800" dirty="0" err="1"/>
               <a:t>WebGL</a:t>
             </a:r>
             <a:endParaRPr lang="zh-TW" altLang="en-US" sz="800" dirty="0"/>
@@ -10557,7 +10547,7 @@
           <a:lstStyle/>
           <a:p>
             <a:r>
-              <a:rPr lang="en-US" altLang="zh-TW" sz="800" dirty="0" smtClean="0"/>
+              <a:rPr lang="en-US" altLang="zh-TW" sz="800" dirty="0"/>
               <a:t>Game Engine</a:t>
             </a:r>
             <a:endParaRPr lang="zh-TW" altLang="en-US" sz="800" dirty="0"/>
@@ -10633,7 +10623,7 @@
           <a:lstStyle/>
           <a:p>
             <a:r>
-              <a:rPr lang="en-US" altLang="zh-TW" sz="800" dirty="0" err="1" smtClean="0"/>
+              <a:rPr lang="en-US" altLang="zh-TW" sz="800" dirty="0"/>
               <a:t>TextureVS</a:t>
             </a:r>
             <a:endParaRPr lang="zh-TW" altLang="en-US" sz="800" dirty="0"/>
@@ -11109,7 +11099,7 @@
             <a:lstStyle/>
             <a:p>
               <a:r>
-                <a:rPr lang="en-US" altLang="zh-TW" sz="800" dirty="0" err="1" smtClean="0"/>
+                <a:rPr lang="en-US" altLang="zh-TW" sz="800" dirty="0" err="1"/>
                 <a:t>Engine_Textures</a:t>
               </a:r>
               <a:endParaRPr lang="zh-TW" altLang="en-US" sz="800" dirty="0"/>
@@ -11203,7 +11193,7 @@
             <a:lstStyle/>
             <a:p>
               <a:r>
-                <a:rPr lang="en-US" altLang="zh-TW" sz="800" dirty="0" err="1" smtClean="0"/>
+                <a:rPr lang="en-US" altLang="zh-TW" sz="800" dirty="0"/>
                 <a:t>aTextureCoordinate</a:t>
               </a:r>
               <a:endParaRPr lang="zh-TW" altLang="en-US" sz="800" dirty="0"/>
@@ -11457,7 +11447,7 @@
             <a:lstStyle/>
             <a:p>
               <a:r>
-                <a:rPr lang="en-US" altLang="zh-TW" sz="700" dirty="0" smtClean="0">
+                <a:rPr lang="en-US" altLang="zh-TW" sz="700" dirty="0">
                   <a:solidFill>
                     <a:schemeClr val="bg1">
                       <a:lumMod val="50000"/>
@@ -11469,7 +11459,7 @@
             </a:p>
             <a:p>
               <a:r>
-                <a:rPr lang="en-US" altLang="zh-TW" sz="700" dirty="0" err="1" smtClean="0">
+                <a:rPr lang="en-US" altLang="zh-TW" sz="700" dirty="0">
                   <a:solidFill>
                     <a:schemeClr val="bg1">
                       <a:lumMod val="50000"/>
@@ -11561,7 +11551,7 @@
           <a:lstStyle/>
           <a:p>
             <a:r>
-              <a:rPr lang="en-US" altLang="zh-TW" sz="800" dirty="0" smtClean="0"/>
+              <a:rPr lang="en-US" altLang="zh-TW" sz="800" dirty="0"/>
               <a:t>per Vertex</a:t>
             </a:r>
             <a:endParaRPr lang="zh-TW" altLang="en-US" sz="800" dirty="0"/>
@@ -11640,7 +11630,7 @@
           <a:lstStyle/>
           <a:p>
             <a:r>
-              <a:rPr lang="en-US" altLang="zh-TW" sz="800" dirty="0" err="1"/>
+              <a:rPr lang="en-US" altLang="zh-TW" sz="800" dirty="0"/>
               <a:t>TextureRenderable</a:t>
             </a:r>
             <a:endParaRPr lang="zh-TW" altLang="en-US" sz="800" dirty="0"/>
@@ -11719,7 +11709,7 @@
           <a:lstStyle/>
           <a:p>
             <a:r>
-              <a:rPr lang="en-US" altLang="zh-TW" sz="800" dirty="0" err="1" smtClean="0"/>
+              <a:rPr lang="en-US" altLang="zh-TW" sz="800" dirty="0"/>
               <a:t>TextureShader</a:t>
             </a:r>
             <a:endParaRPr lang="zh-TW" altLang="en-US" sz="800" dirty="0"/>
@@ -11993,7 +11983,7 @@
           <a:lstStyle/>
           <a:p>
             <a:r>
-              <a:rPr lang="en-US" altLang="zh-TW" sz="800" dirty="0" err="1" smtClean="0"/>
+              <a:rPr lang="en-US" altLang="zh-TW" sz="800" dirty="0" err="1"/>
               <a:t>SpriteRenderable</a:t>
             </a:r>
             <a:endParaRPr lang="zh-TW" altLang="en-US" sz="800" dirty="0"/>
@@ -12072,7 +12062,7 @@
           <a:lstStyle/>
           <a:p>
             <a:r>
-              <a:rPr lang="en-US" altLang="zh-TW" sz="800" dirty="0" err="1" smtClean="0"/>
+              <a:rPr lang="en-US" altLang="zh-TW" sz="800" dirty="0" err="1"/>
               <a:t>SpriteShader</a:t>
             </a:r>
             <a:endParaRPr lang="zh-TW" altLang="en-US" sz="800" dirty="0"/>
@@ -12105,7 +12095,7 @@
           <a:lstStyle/>
           <a:p>
             <a:r>
-              <a:rPr lang="en-US" altLang="zh-TW" sz="800" dirty="0" err="1" smtClean="0"/>
+              <a:rPr lang="en-US" altLang="zh-TW" sz="800" dirty="0" err="1"/>
               <a:t>mTexCoordBuffer</a:t>
             </a:r>
             <a:endParaRPr lang="zh-TW" altLang="en-US" sz="800" dirty="0"/>

</xml_diff>

<commit_message>
Chapter 5, first 30 pages pass one.
</commit_message>
<xml_diff>
--- a/Word/Diagrams/chapter5/chap 5 extra.figures.pptx
+++ b/Word/Diagrams/chapter5/chap 5 extra.figures.pptx
@@ -211,7 +211,7 @@
             <a:fld id="{9CCF083D-F2BC-4786-8C77-844DFCD3515B}" type="datetimeFigureOut">
               <a:rPr lang="zh-TW" altLang="en-US" smtClean="0"/>
               <a:pPr/>
-              <a:t>2021/4/21</a:t>
+              <a:t>2021/4/22</a:t>
             </a:fld>
             <a:endParaRPr lang="zh-TW" altLang="en-US"/>
           </a:p>
@@ -675,7 +675,7 @@
             <a:fld id="{E3D07B0C-BD95-41BE-BB3E-AC75822DF381}" type="datetimeFigureOut">
               <a:rPr lang="en-US" smtClean="0"/>
               <a:pPr/>
-              <a:t>4/21/2021</a:t>
+              <a:t>4/22/2021</a:t>
             </a:fld>
             <a:endParaRPr lang="en-US"/>
           </a:p>
@@ -840,7 +840,7 @@
             <a:fld id="{E3D07B0C-BD95-41BE-BB3E-AC75822DF381}" type="datetimeFigureOut">
               <a:rPr lang="en-US" smtClean="0"/>
               <a:pPr/>
-              <a:t>4/21/2021</a:t>
+              <a:t>4/22/2021</a:t>
             </a:fld>
             <a:endParaRPr lang="en-US"/>
           </a:p>
@@ -1016,7 +1016,7 @@
             <a:fld id="{E3D07B0C-BD95-41BE-BB3E-AC75822DF381}" type="datetimeFigureOut">
               <a:rPr lang="en-US" smtClean="0"/>
               <a:pPr/>
-              <a:t>4/21/2021</a:t>
+              <a:t>4/22/2021</a:t>
             </a:fld>
             <a:endParaRPr lang="en-US"/>
           </a:p>
@@ -1181,7 +1181,7 @@
             <a:fld id="{E3D07B0C-BD95-41BE-BB3E-AC75822DF381}" type="datetimeFigureOut">
               <a:rPr lang="en-US" smtClean="0"/>
               <a:pPr/>
-              <a:t>4/21/2021</a:t>
+              <a:t>4/22/2021</a:t>
             </a:fld>
             <a:endParaRPr lang="en-US"/>
           </a:p>
@@ -1424,7 +1424,7 @@
             <a:fld id="{E3D07B0C-BD95-41BE-BB3E-AC75822DF381}" type="datetimeFigureOut">
               <a:rPr lang="en-US" smtClean="0"/>
               <a:pPr/>
-              <a:t>4/21/2021</a:t>
+              <a:t>4/22/2021</a:t>
             </a:fld>
             <a:endParaRPr lang="en-US"/>
           </a:p>
@@ -1708,7 +1708,7 @@
             <a:fld id="{E3D07B0C-BD95-41BE-BB3E-AC75822DF381}" type="datetimeFigureOut">
               <a:rPr lang="en-US" smtClean="0"/>
               <a:pPr/>
-              <a:t>4/21/2021</a:t>
+              <a:t>4/22/2021</a:t>
             </a:fld>
             <a:endParaRPr lang="en-US"/>
           </a:p>
@@ -2137,7 +2137,7 @@
             <a:fld id="{E3D07B0C-BD95-41BE-BB3E-AC75822DF381}" type="datetimeFigureOut">
               <a:rPr lang="en-US" smtClean="0"/>
               <a:pPr/>
-              <a:t>4/21/2021</a:t>
+              <a:t>4/22/2021</a:t>
             </a:fld>
             <a:endParaRPr lang="en-US"/>
           </a:p>
@@ -2251,7 +2251,7 @@
             <a:fld id="{E3D07B0C-BD95-41BE-BB3E-AC75822DF381}" type="datetimeFigureOut">
               <a:rPr lang="en-US" smtClean="0"/>
               <a:pPr/>
-              <a:t>4/21/2021</a:t>
+              <a:t>4/22/2021</a:t>
             </a:fld>
             <a:endParaRPr lang="en-US"/>
           </a:p>
@@ -2343,7 +2343,7 @@
             <a:fld id="{E3D07B0C-BD95-41BE-BB3E-AC75822DF381}" type="datetimeFigureOut">
               <a:rPr lang="en-US" smtClean="0"/>
               <a:pPr/>
-              <a:t>4/21/2021</a:t>
+              <a:t>4/22/2021</a:t>
             </a:fld>
             <a:endParaRPr lang="en-US"/>
           </a:p>
@@ -2534,7 +2534,7 @@
             <a:fld id="{E3D07B0C-BD95-41BE-BB3E-AC75822DF381}" type="datetimeFigureOut">
               <a:rPr lang="en-US" smtClean="0"/>
               <a:pPr/>
-              <a:t>4/21/2021</a:t>
+              <a:t>4/22/2021</a:t>
             </a:fld>
             <a:endParaRPr lang="en-US"/>
           </a:p>
@@ -2853,7 +2853,7 @@
             <a:fld id="{E3D07B0C-BD95-41BE-BB3E-AC75822DF381}" type="datetimeFigureOut">
               <a:rPr lang="en-US" smtClean="0"/>
               <a:pPr/>
-              <a:t>4/21/2021</a:t>
+              <a:t>4/22/2021</a:t>
             </a:fld>
             <a:endParaRPr lang="en-US"/>
           </a:p>
@@ -3235,7 +3235,7 @@
             <a:fld id="{E3D07B0C-BD95-41BE-BB3E-AC75822DF381}" type="datetimeFigureOut">
               <a:rPr lang="en-US" smtClean="0"/>
               <a:pPr/>
-              <a:t>4/21/2021</a:t>
+              <a:t>4/22/2021</a:t>
             </a:fld>
             <a:endParaRPr lang="en-US"/>
           </a:p>
@@ -10220,8 +10220,8 @@
         </p:nvGrpSpPr>
         <p:grpSpPr>
           <a:xfrm>
-            <a:off x="3797434" y="1454879"/>
-            <a:ext cx="929233" cy="215444"/>
+            <a:off x="3797435" y="1454879"/>
+            <a:ext cx="564082" cy="215444"/>
             <a:chOff x="4173160" y="1371600"/>
             <a:chExt cx="929233" cy="215444"/>
           </a:xfrm>
@@ -10253,7 +10253,7 @@
             <a:p>
               <a:r>
                 <a:rPr lang="en-US" altLang="zh-TW" sz="800" dirty="0" err="1"/>
-                <a:t>Engine_VertexBuffer</a:t>
+                <a:t>vertexBuffer</a:t>
               </a:r>
               <a:endParaRPr lang="zh-TW" altLang="en-US" sz="800" dirty="0"/>
             </a:p>
@@ -11067,8 +11067,8 @@
         </p:nvGrpSpPr>
         <p:grpSpPr>
           <a:xfrm>
-            <a:off x="4775538" y="1454879"/>
-            <a:ext cx="731671" cy="215444"/>
+            <a:off x="4438127" y="1454879"/>
+            <a:ext cx="329861" cy="215444"/>
             <a:chOff x="4173161" y="1367463"/>
             <a:chExt cx="731671" cy="215444"/>
           </a:xfrm>
@@ -11082,7 +11082,7 @@
           <p:spPr>
             <a:xfrm>
               <a:off x="4188568" y="1367463"/>
-              <a:ext cx="700856" cy="215444"/>
+              <a:ext cx="700857" cy="215444"/>
             </a:xfrm>
             <a:prstGeom prst="rect">
               <a:avLst/>
@@ -11099,8 +11099,8 @@
             <a:lstStyle/>
             <a:p>
               <a:r>
-                <a:rPr lang="en-US" altLang="zh-TW" sz="800" dirty="0" err="1"/>
-                <a:t>Engine_Textures</a:t>
+                <a:rPr lang="en-US" altLang="zh-TW" sz="800" dirty="0"/>
+                <a:t>texture</a:t>
               </a:r>
               <a:endParaRPr lang="zh-TW" altLang="en-US" sz="800" dirty="0"/>
             </a:p>

</xml_diff>

<commit_message>
Chap 5 fig 5, 6, 10: should use SimpleShader and not just Shader
</commit_message>
<xml_diff>
--- a/Word/Diagrams/chapter5/chap 5 extra.figures.pptx
+++ b/Word/Diagrams/chapter5/chap 5 extra.figures.pptx
@@ -211,7 +211,7 @@
             <a:fld id="{9CCF083D-F2BC-4786-8C77-844DFCD3515B}" type="datetimeFigureOut">
               <a:rPr lang="zh-TW" altLang="en-US" smtClean="0"/>
               <a:pPr/>
-              <a:t>2021/4/22</a:t>
+              <a:t>2021/8/30</a:t>
             </a:fld>
             <a:endParaRPr lang="zh-TW" altLang="en-US"/>
           </a:p>
@@ -675,7 +675,7 @@
             <a:fld id="{E3D07B0C-BD95-41BE-BB3E-AC75822DF381}" type="datetimeFigureOut">
               <a:rPr lang="en-US" smtClean="0"/>
               <a:pPr/>
-              <a:t>4/22/2021</a:t>
+              <a:t>8/30/2021</a:t>
             </a:fld>
             <a:endParaRPr lang="en-US"/>
           </a:p>
@@ -840,7 +840,7 @@
             <a:fld id="{E3D07B0C-BD95-41BE-BB3E-AC75822DF381}" type="datetimeFigureOut">
               <a:rPr lang="en-US" smtClean="0"/>
               <a:pPr/>
-              <a:t>4/22/2021</a:t>
+              <a:t>8/30/2021</a:t>
             </a:fld>
             <a:endParaRPr lang="en-US"/>
           </a:p>
@@ -1016,7 +1016,7 @@
             <a:fld id="{E3D07B0C-BD95-41BE-BB3E-AC75822DF381}" type="datetimeFigureOut">
               <a:rPr lang="en-US" smtClean="0"/>
               <a:pPr/>
-              <a:t>4/22/2021</a:t>
+              <a:t>8/30/2021</a:t>
             </a:fld>
             <a:endParaRPr lang="en-US"/>
           </a:p>
@@ -1181,7 +1181,7 @@
             <a:fld id="{E3D07B0C-BD95-41BE-BB3E-AC75822DF381}" type="datetimeFigureOut">
               <a:rPr lang="en-US" smtClean="0"/>
               <a:pPr/>
-              <a:t>4/22/2021</a:t>
+              <a:t>8/30/2021</a:t>
             </a:fld>
             <a:endParaRPr lang="en-US"/>
           </a:p>
@@ -1424,7 +1424,7 @@
             <a:fld id="{E3D07B0C-BD95-41BE-BB3E-AC75822DF381}" type="datetimeFigureOut">
               <a:rPr lang="en-US" smtClean="0"/>
               <a:pPr/>
-              <a:t>4/22/2021</a:t>
+              <a:t>8/30/2021</a:t>
             </a:fld>
             <a:endParaRPr lang="en-US"/>
           </a:p>
@@ -1708,7 +1708,7 @@
             <a:fld id="{E3D07B0C-BD95-41BE-BB3E-AC75822DF381}" type="datetimeFigureOut">
               <a:rPr lang="en-US" smtClean="0"/>
               <a:pPr/>
-              <a:t>4/22/2021</a:t>
+              <a:t>8/30/2021</a:t>
             </a:fld>
             <a:endParaRPr lang="en-US"/>
           </a:p>
@@ -2137,7 +2137,7 @@
             <a:fld id="{E3D07B0C-BD95-41BE-BB3E-AC75822DF381}" type="datetimeFigureOut">
               <a:rPr lang="en-US" smtClean="0"/>
               <a:pPr/>
-              <a:t>4/22/2021</a:t>
+              <a:t>8/30/2021</a:t>
             </a:fld>
             <a:endParaRPr lang="en-US"/>
           </a:p>
@@ -2251,7 +2251,7 @@
             <a:fld id="{E3D07B0C-BD95-41BE-BB3E-AC75822DF381}" type="datetimeFigureOut">
               <a:rPr lang="en-US" smtClean="0"/>
               <a:pPr/>
-              <a:t>4/22/2021</a:t>
+              <a:t>8/30/2021</a:t>
             </a:fld>
             <a:endParaRPr lang="en-US"/>
           </a:p>
@@ -2343,7 +2343,7 @@
             <a:fld id="{E3D07B0C-BD95-41BE-BB3E-AC75822DF381}" type="datetimeFigureOut">
               <a:rPr lang="en-US" smtClean="0"/>
               <a:pPr/>
-              <a:t>4/22/2021</a:t>
+              <a:t>8/30/2021</a:t>
             </a:fld>
             <a:endParaRPr lang="en-US"/>
           </a:p>
@@ -2534,7 +2534,7 @@
             <a:fld id="{E3D07B0C-BD95-41BE-BB3E-AC75822DF381}" type="datetimeFigureOut">
               <a:rPr lang="en-US" smtClean="0"/>
               <a:pPr/>
-              <a:t>4/22/2021</a:t>
+              <a:t>8/30/2021</a:t>
             </a:fld>
             <a:endParaRPr lang="en-US"/>
           </a:p>
@@ -2853,7 +2853,7 @@
             <a:fld id="{E3D07B0C-BD95-41BE-BB3E-AC75822DF381}" type="datetimeFigureOut">
               <a:rPr lang="en-US" smtClean="0"/>
               <a:pPr/>
-              <a:t>4/22/2021</a:t>
+              <a:t>8/30/2021</a:t>
             </a:fld>
             <a:endParaRPr lang="en-US"/>
           </a:p>
@@ -3235,7 +3235,7 @@
             <a:fld id="{E3D07B0C-BD95-41BE-BB3E-AC75822DF381}" type="datetimeFigureOut">
               <a:rPr lang="en-US" smtClean="0"/>
               <a:pPr/>
-              <a:t>4/22/2021</a:t>
+              <a:t>8/30/2021</a:t>
             </a:fld>
             <a:endParaRPr lang="en-US"/>
           </a:p>
@@ -4075,8 +4075,8 @@
           </p:nvSpPr>
           <p:spPr>
             <a:xfrm>
-              <a:off x="3310809" y="2222956"/>
-              <a:ext cx="313118" cy="215444"/>
+              <a:off x="3086604" y="2222956"/>
+              <a:ext cx="763913" cy="215444"/>
             </a:xfrm>
             <a:prstGeom prst="rect">
               <a:avLst/>
@@ -4092,9 +4092,10 @@
             </a:bodyPr>
             <a:lstStyle/>
             <a:p>
+              <a:pPr algn="ctr"/>
               <a:r>
                 <a:rPr lang="en-US" altLang="zh-TW" sz="800" dirty="0"/>
-                <a:t>Shader</a:t>
+                <a:t>SimpleShader</a:t>
               </a:r>
               <a:endParaRPr lang="zh-TW" altLang="en-US" sz="800" dirty="0"/>
             </a:p>
@@ -7461,10 +7462,10 @@
         </p:nvGrpSpPr>
         <p:grpSpPr>
           <a:xfrm>
-            <a:off x="3074177" y="2094709"/>
-            <a:ext cx="786384" cy="215444"/>
-            <a:chOff x="3074177" y="2222956"/>
-            <a:chExt cx="786384" cy="215444"/>
+            <a:off x="3062038" y="2094709"/>
+            <a:ext cx="798523" cy="215444"/>
+            <a:chOff x="3062038" y="2222956"/>
+            <a:chExt cx="798523" cy="215444"/>
           </a:xfrm>
         </p:grpSpPr>
         <p:sp>
@@ -7475,8 +7476,8 @@
           </p:nvSpPr>
           <p:spPr>
             <a:xfrm>
-              <a:off x="3283077" y="2222956"/>
-              <a:ext cx="312424" cy="215444"/>
+              <a:off x="3062038" y="2222956"/>
+              <a:ext cx="699942" cy="215444"/>
             </a:xfrm>
             <a:prstGeom prst="rect">
               <a:avLst/>
@@ -7492,9 +7493,10 @@
             </a:bodyPr>
             <a:lstStyle/>
             <a:p>
+              <a:pPr algn="ctr"/>
               <a:r>
                 <a:rPr lang="en-US" altLang="zh-TW" sz="800" dirty="0"/>
-                <a:t>Shader</a:t>
+                <a:t>SimpleShader</a:t>
               </a:r>
               <a:endParaRPr lang="zh-TW" altLang="en-US" sz="800" dirty="0"/>
             </a:p>
@@ -10422,8 +10424,8 @@
           </p:nvSpPr>
           <p:spPr>
             <a:xfrm>
-              <a:off x="3283077" y="2222956"/>
-              <a:ext cx="312424" cy="215444"/>
+              <a:off x="3131066" y="2222956"/>
+              <a:ext cx="605329" cy="215444"/>
             </a:xfrm>
             <a:prstGeom prst="rect">
               <a:avLst/>
@@ -10441,7 +10443,7 @@
             <a:p>
               <a:r>
                 <a:rPr lang="en-US" altLang="zh-TW" sz="800" dirty="0"/>
-                <a:t>Shader</a:t>
+                <a:t>SimpleShader</a:t>
               </a:r>
               <a:endParaRPr lang="zh-TW" altLang="en-US" sz="800" dirty="0"/>
             </a:p>

</xml_diff>

<commit_message>
TR Final Chap 4 and 5
</commit_message>
<xml_diff>
--- a/Word/Diagrams/chapter5/chap 5 extra.figures.pptx
+++ b/Word/Diagrams/chapter5/chap 5 extra.figures.pptx
@@ -211,7 +211,7 @@
             <a:fld id="{9CCF083D-F2BC-4786-8C77-844DFCD3515B}" type="datetimeFigureOut">
               <a:rPr lang="zh-TW" altLang="en-US" smtClean="0"/>
               <a:pPr/>
-              <a:t>2021/8/30</a:t>
+              <a:t>2021/9/5</a:t>
             </a:fld>
             <a:endParaRPr lang="zh-TW" altLang="en-US"/>
           </a:p>
@@ -675,7 +675,7 @@
             <a:fld id="{E3D07B0C-BD95-41BE-BB3E-AC75822DF381}" type="datetimeFigureOut">
               <a:rPr lang="en-US" smtClean="0"/>
               <a:pPr/>
-              <a:t>8/30/2021</a:t>
+              <a:t>9/5/2021</a:t>
             </a:fld>
             <a:endParaRPr lang="en-US"/>
           </a:p>
@@ -840,7 +840,7 @@
             <a:fld id="{E3D07B0C-BD95-41BE-BB3E-AC75822DF381}" type="datetimeFigureOut">
               <a:rPr lang="en-US" smtClean="0"/>
               <a:pPr/>
-              <a:t>8/30/2021</a:t>
+              <a:t>9/5/2021</a:t>
             </a:fld>
             <a:endParaRPr lang="en-US"/>
           </a:p>
@@ -1016,7 +1016,7 @@
             <a:fld id="{E3D07B0C-BD95-41BE-BB3E-AC75822DF381}" type="datetimeFigureOut">
               <a:rPr lang="en-US" smtClean="0"/>
               <a:pPr/>
-              <a:t>8/30/2021</a:t>
+              <a:t>9/5/2021</a:t>
             </a:fld>
             <a:endParaRPr lang="en-US"/>
           </a:p>
@@ -1181,7 +1181,7 @@
             <a:fld id="{E3D07B0C-BD95-41BE-BB3E-AC75822DF381}" type="datetimeFigureOut">
               <a:rPr lang="en-US" smtClean="0"/>
               <a:pPr/>
-              <a:t>8/30/2021</a:t>
+              <a:t>9/5/2021</a:t>
             </a:fld>
             <a:endParaRPr lang="en-US"/>
           </a:p>
@@ -1424,7 +1424,7 @@
             <a:fld id="{E3D07B0C-BD95-41BE-BB3E-AC75822DF381}" type="datetimeFigureOut">
               <a:rPr lang="en-US" smtClean="0"/>
               <a:pPr/>
-              <a:t>8/30/2021</a:t>
+              <a:t>9/5/2021</a:t>
             </a:fld>
             <a:endParaRPr lang="en-US"/>
           </a:p>
@@ -1708,7 +1708,7 @@
             <a:fld id="{E3D07B0C-BD95-41BE-BB3E-AC75822DF381}" type="datetimeFigureOut">
               <a:rPr lang="en-US" smtClean="0"/>
               <a:pPr/>
-              <a:t>8/30/2021</a:t>
+              <a:t>9/5/2021</a:t>
             </a:fld>
             <a:endParaRPr lang="en-US"/>
           </a:p>
@@ -2137,7 +2137,7 @@
             <a:fld id="{E3D07B0C-BD95-41BE-BB3E-AC75822DF381}" type="datetimeFigureOut">
               <a:rPr lang="en-US" smtClean="0"/>
               <a:pPr/>
-              <a:t>8/30/2021</a:t>
+              <a:t>9/5/2021</a:t>
             </a:fld>
             <a:endParaRPr lang="en-US"/>
           </a:p>
@@ -2251,7 +2251,7 @@
             <a:fld id="{E3D07B0C-BD95-41BE-BB3E-AC75822DF381}" type="datetimeFigureOut">
               <a:rPr lang="en-US" smtClean="0"/>
               <a:pPr/>
-              <a:t>8/30/2021</a:t>
+              <a:t>9/5/2021</a:t>
             </a:fld>
             <a:endParaRPr lang="en-US"/>
           </a:p>
@@ -2343,7 +2343,7 @@
             <a:fld id="{E3D07B0C-BD95-41BE-BB3E-AC75822DF381}" type="datetimeFigureOut">
               <a:rPr lang="en-US" smtClean="0"/>
               <a:pPr/>
-              <a:t>8/30/2021</a:t>
+              <a:t>9/5/2021</a:t>
             </a:fld>
             <a:endParaRPr lang="en-US"/>
           </a:p>
@@ -2534,7 +2534,7 @@
             <a:fld id="{E3D07B0C-BD95-41BE-BB3E-AC75822DF381}" type="datetimeFigureOut">
               <a:rPr lang="en-US" smtClean="0"/>
               <a:pPr/>
-              <a:t>8/30/2021</a:t>
+              <a:t>9/5/2021</a:t>
             </a:fld>
             <a:endParaRPr lang="en-US"/>
           </a:p>
@@ -2853,7 +2853,7 @@
             <a:fld id="{E3D07B0C-BD95-41BE-BB3E-AC75822DF381}" type="datetimeFigureOut">
               <a:rPr lang="en-US" smtClean="0"/>
               <a:pPr/>
-              <a:t>8/30/2021</a:t>
+              <a:t>9/5/2021</a:t>
             </a:fld>
             <a:endParaRPr lang="en-US"/>
           </a:p>
@@ -3235,7 +3235,7 @@
             <a:fld id="{E3D07B0C-BD95-41BE-BB3E-AC75822DF381}" type="datetimeFigureOut">
               <a:rPr lang="en-US" smtClean="0"/>
               <a:pPr/>
-              <a:t>8/30/2021</a:t>
+              <a:t>9/5/2021</a:t>
             </a:fld>
             <a:endParaRPr lang="en-US"/>
           </a:p>
@@ -5073,8 +5073,8 @@
           <a:lstStyle/>
           <a:p>
             <a:r>
-              <a:rPr lang="en-US" altLang="zh-TW" sz="800" dirty="0"/>
-              <a:t>SimpeVS</a:t>
+              <a:rPr lang="en-US" altLang="zh-TW" sz="800" dirty="0" err="1"/>
+              <a:t>SimpleVS</a:t>
             </a:r>
             <a:endParaRPr lang="zh-TW" altLang="en-US" sz="800" dirty="0"/>
           </a:p>

</xml_diff>